<commit_message>
Update testing pyramid picture
</commit_message>
<xml_diff>
--- a/docs/automated-testing/cdc-testing/images/images.pptx
+++ b/docs/automated-testing/cdc-testing/images/images.pptx
@@ -114,15 +114,17 @@
 </file>
 
 <file path=ppt/diagrams/colors1.xml><?xml version="1.0" encoding="utf-8"?>
-<dgm:colorsDef xmlns:dgm="http://schemas.openxmlformats.org/drawingml/2006/diagram" xmlns:a="http://schemas.openxmlformats.org/drawingml/2006/main" uniqueId="urn:microsoft.com/office/officeart/2005/8/colors/colorful1">
+<dgm:colorsDef xmlns:dgm="http://schemas.openxmlformats.org/drawingml/2006/diagram" xmlns:a="http://schemas.openxmlformats.org/drawingml/2006/main" uniqueId="urn:microsoft.com/office/officeart/2005/8/colors/accent1_5">
   <dgm:title val=""/>
   <dgm:desc val=""/>
   <dgm:catLst>
-    <dgm:cat type="colorful" pri="10100"/>
+    <dgm:cat type="accent1" pri="11500"/>
   </dgm:catLst>
   <dgm:styleLbl name="node0">
-    <dgm:fillClrLst meth="repeat">
-      <a:schemeClr val="accent1"/>
+    <dgm:fillClrLst meth="cycle">
+      <a:schemeClr val="accent1">
+        <a:alpha val="80000"/>
+      </a:schemeClr>
     </dgm:fillClrLst>
     <dgm:linClrLst meth="repeat">
       <a:schemeClr val="lt1"/>
@@ -133,12 +135,13 @@
     <dgm:txEffectClrLst/>
   </dgm:styleLbl>
   <dgm:styleLbl name="node1">
-    <dgm:fillClrLst meth="repeat">
-      <a:schemeClr val="accent2"/>
-      <a:schemeClr val="accent3"/>
-      <a:schemeClr val="accent4"/>
-      <a:schemeClr val="accent5"/>
-      <a:schemeClr val="accent6"/>
+    <dgm:fillClrLst>
+      <a:schemeClr val="accent1">
+        <a:alpha val="90000"/>
+      </a:schemeClr>
+      <a:schemeClr val="accent1">
+        <a:alpha val="50000"/>
+      </a:schemeClr>
     </dgm:fillClrLst>
     <dgm:linClrLst meth="repeat">
       <a:schemeClr val="lt1"/>
@@ -149,19 +152,21 @@
     <dgm:txEffectClrLst/>
   </dgm:styleLbl>
   <dgm:styleLbl name="alignNode1">
-    <dgm:fillClrLst meth="repeat">
-      <a:schemeClr val="accent2"/>
-      <a:schemeClr val="accent3"/>
-      <a:schemeClr val="accent4"/>
-      <a:schemeClr val="accent5"/>
-      <a:schemeClr val="accent6"/>
+    <dgm:fillClrLst>
+      <a:schemeClr val="accent1">
+        <a:alpha val="90000"/>
+      </a:schemeClr>
+      <a:schemeClr val="accent1">
+        <a:alpha val="50000"/>
+      </a:schemeClr>
     </dgm:fillClrLst>
-    <dgm:linClrLst meth="repeat">
-      <a:schemeClr val="accent2"/>
-      <a:schemeClr val="accent3"/>
-      <a:schemeClr val="accent4"/>
-      <a:schemeClr val="accent5"/>
-      <a:schemeClr val="accent6"/>
+    <dgm:linClrLst>
+      <a:schemeClr val="accent1">
+        <a:alpha val="90000"/>
+      </a:schemeClr>
+      <a:schemeClr val="accent1">
+        <a:alpha val="50000"/>
+      </a:schemeClr>
     </dgm:linClrLst>
     <dgm:effectClrLst/>
     <dgm:txLinClrLst/>
@@ -169,12 +174,14 @@
     <dgm:txEffectClrLst/>
   </dgm:styleLbl>
   <dgm:styleLbl name="lnNode1">
-    <dgm:fillClrLst meth="repeat">
-      <a:schemeClr val="accent2"/>
-      <a:schemeClr val="accent3"/>
-      <a:schemeClr val="accent4"/>
-      <a:schemeClr val="accent5"/>
-      <a:schemeClr val="accent6"/>
+    <dgm:fillClrLst>
+      <a:schemeClr val="accent1">
+        <a:shade val="90000"/>
+      </a:schemeClr>
+      <a:schemeClr val="accent1">
+        <a:alpha val="50000"/>
+        <a:tint val="50000"/>
+      </a:schemeClr>
     </dgm:fillClrLst>
     <dgm:linClrLst meth="repeat">
       <a:schemeClr val="lt1"/>
@@ -185,21 +192,13 @@
     <dgm:txEffectClrLst/>
   </dgm:styleLbl>
   <dgm:styleLbl name="vennNode1">
-    <dgm:fillClrLst meth="repeat">
-      <a:schemeClr val="accent2">
+    <dgm:fillClrLst>
+      <a:schemeClr val="accent1">
+        <a:shade val="80000"/>
         <a:alpha val="50000"/>
       </a:schemeClr>
-      <a:schemeClr val="accent3">
-        <a:alpha val="50000"/>
-      </a:schemeClr>
-      <a:schemeClr val="accent4">
-        <a:alpha val="50000"/>
-      </a:schemeClr>
-      <a:schemeClr val="accent5">
-        <a:alpha val="50000"/>
-      </a:schemeClr>
-      <a:schemeClr val="accent6">
-        <a:alpha val="50000"/>
+      <a:schemeClr val="accent1">
+        <a:alpha val="80000"/>
       </a:schemeClr>
     </dgm:fillClrLst>
     <dgm:linClrLst meth="repeat">
@@ -212,7 +211,9 @@
   </dgm:styleLbl>
   <dgm:styleLbl name="node2">
     <dgm:fillClrLst>
-      <a:schemeClr val="accent2"/>
+      <a:schemeClr val="accent1">
+        <a:alpha val="70000"/>
+      </a:schemeClr>
     </dgm:fillClrLst>
     <dgm:linClrLst meth="repeat">
       <a:schemeClr val="lt1"/>
@@ -224,7 +225,9 @@
   </dgm:styleLbl>
   <dgm:styleLbl name="node3">
     <dgm:fillClrLst>
-      <a:schemeClr val="accent3"/>
+      <a:schemeClr val="accent1">
+        <a:alpha val="50000"/>
+      </a:schemeClr>
     </dgm:fillClrLst>
     <dgm:linClrLst meth="repeat">
       <a:schemeClr val="lt1"/>
@@ -236,7 +239,9 @@
   </dgm:styleLbl>
   <dgm:styleLbl name="node4">
     <dgm:fillClrLst>
-      <a:schemeClr val="accent4"/>
+      <a:schemeClr val="accent1">
+        <a:alpha val="30000"/>
+      </a:schemeClr>
     </dgm:fillClrLst>
     <dgm:linClrLst meth="repeat">
       <a:schemeClr val="lt1"/>
@@ -247,21 +252,14 @@
     <dgm:txEffectClrLst/>
   </dgm:styleLbl>
   <dgm:styleLbl name="fgImgPlace1">
-    <dgm:fillClrLst meth="repeat">
-      <a:schemeClr val="accent2">
+    <dgm:fillClrLst>
+      <a:schemeClr val="accent1">
         <a:tint val="50000"/>
-      </a:schemeClr>
-      <a:schemeClr val="accent3">
-        <a:tint val="50000"/>
-      </a:schemeClr>
-      <a:schemeClr val="accent4">
-        <a:tint val="50000"/>
-      </a:schemeClr>
-      <a:schemeClr val="accent5">
-        <a:tint val="50000"/>
-      </a:schemeClr>
-      <a:schemeClr val="accent6">
-        <a:tint val="50000"/>
+        <a:alpha val="90000"/>
+      </a:schemeClr>
+      <a:schemeClr val="accent1">
+        <a:tint val="20000"/>
+        <a:alpha val="50000"/>
       </a:schemeClr>
     </dgm:fillClrLst>
     <dgm:linClrLst meth="repeat">
@@ -279,7 +277,7 @@
       <a:schemeClr val="accent1">
         <a:tint val="50000"/>
       </a:schemeClr>
-      <a:schemeClr val="accent2">
+      <a:schemeClr val="accent1">
         <a:tint val="20000"/>
       </a:schemeClr>
     </dgm:fillClrLst>
@@ -298,7 +296,7 @@
       <a:schemeClr val="accent1">
         <a:tint val="50000"/>
       </a:schemeClr>
-      <a:schemeClr val="accent2">
+      <a:schemeClr val="accent1">
         <a:tint val="20000"/>
       </a:schemeClr>
     </dgm:fillClrLst>
@@ -313,15 +311,21 @@
     <dgm:txEffectClrLst/>
   </dgm:styleLbl>
   <dgm:styleLbl name="sibTrans2D1">
-    <dgm:fillClrLst meth="repeat">
-      <a:schemeClr val="accent2"/>
-      <a:schemeClr val="accent3"/>
-      <a:schemeClr val="accent4"/>
-      <a:schemeClr val="accent5"/>
-      <a:schemeClr val="accent6"/>
+    <dgm:fillClrLst>
+      <a:schemeClr val="accent1">
+        <a:shade val="90000"/>
+      </a:schemeClr>
+      <a:schemeClr val="accent1">
+        <a:tint val="50000"/>
+      </a:schemeClr>
     </dgm:fillClrLst>
-    <dgm:linClrLst meth="cycle">
-      <a:schemeClr val="lt1"/>
+    <dgm:linClrLst>
+      <a:schemeClr val="accent1">
+        <a:shade val="90000"/>
+      </a:schemeClr>
+      <a:schemeClr val="accent1">
+        <a:tint val="50000"/>
+      </a:schemeClr>
     </dgm:linClrLst>
     <dgm:effectClrLst/>
     <dgm:txLinClrLst/>
@@ -329,55 +333,65 @@
     <dgm:txEffectClrLst/>
   </dgm:styleLbl>
   <dgm:styleLbl name="fgSibTrans2D1">
-    <dgm:fillClrLst meth="repeat">
-      <a:schemeClr val="accent2"/>
-      <a:schemeClr val="accent3"/>
-      <a:schemeClr val="accent4"/>
-      <a:schemeClr val="accent5"/>
-      <a:schemeClr val="accent6"/>
+    <dgm:fillClrLst>
+      <a:schemeClr val="accent1">
+        <a:shade val="90000"/>
+      </a:schemeClr>
+      <a:schemeClr val="accent1">
+        <a:tint val="50000"/>
+      </a:schemeClr>
     </dgm:fillClrLst>
-    <dgm:linClrLst meth="cycle">
-      <a:schemeClr val="lt1"/>
+    <dgm:linClrLst>
+      <a:schemeClr val="accent1">
+        <a:shade val="90000"/>
+      </a:schemeClr>
+      <a:schemeClr val="accent1">
+        <a:tint val="50000"/>
+      </a:schemeClr>
     </dgm:linClrLst>
     <dgm:effectClrLst/>
     <dgm:txLinClrLst/>
-    <dgm:txFillClrLst meth="repeat">
-      <a:schemeClr val="lt1"/>
-    </dgm:txFillClrLst>
+    <dgm:txFillClrLst/>
     <dgm:txEffectClrLst/>
   </dgm:styleLbl>
   <dgm:styleLbl name="bgSibTrans2D1">
-    <dgm:fillClrLst meth="repeat">
-      <a:schemeClr val="accent2"/>
-      <a:schemeClr val="accent3"/>
-      <a:schemeClr val="accent4"/>
-      <a:schemeClr val="accent5"/>
-      <a:schemeClr val="accent6"/>
+    <dgm:fillClrLst>
+      <a:schemeClr val="accent1">
+        <a:shade val="90000"/>
+      </a:schemeClr>
+      <a:schemeClr val="accent1">
+        <a:tint val="50000"/>
+      </a:schemeClr>
     </dgm:fillClrLst>
-    <dgm:linClrLst meth="cycle">
-      <a:schemeClr val="lt1"/>
+    <dgm:linClrLst>
+      <a:schemeClr val="accent1">
+        <a:shade val="90000"/>
+      </a:schemeClr>
+      <a:schemeClr val="accent1">
+        <a:tint val="50000"/>
+      </a:schemeClr>
     </dgm:linClrLst>
     <dgm:effectClrLst/>
     <dgm:txLinClrLst/>
-    <dgm:txFillClrLst meth="repeat">
-      <a:schemeClr val="lt1"/>
-    </dgm:txFillClrLst>
+    <dgm:txFillClrLst/>
     <dgm:txEffectClrLst/>
   </dgm:styleLbl>
   <dgm:styleLbl name="sibTrans1D1">
-    <dgm:fillClrLst meth="repeat">
-      <a:schemeClr val="accent2"/>
-      <a:schemeClr val="accent3"/>
-      <a:schemeClr val="accent4"/>
-      <a:schemeClr val="accent5"/>
-      <a:schemeClr val="accent6"/>
+    <dgm:fillClrLst>
+      <a:schemeClr val="accent1">
+        <a:shade val="90000"/>
+      </a:schemeClr>
+      <a:schemeClr val="accent1">
+        <a:tint val="50000"/>
+      </a:schemeClr>
     </dgm:fillClrLst>
-    <dgm:linClrLst meth="repeat">
-      <a:schemeClr val="accent2"/>
-      <a:schemeClr val="accent3"/>
-      <a:schemeClr val="accent4"/>
-      <a:schemeClr val="accent5"/>
-      <a:schemeClr val="accent6"/>
+    <dgm:linClrLst>
+      <a:schemeClr val="accent1">
+        <a:shade val="90000"/>
+      </a:schemeClr>
+      <a:schemeClr val="accent1">
+        <a:tint val="50000"/>
+      </a:schemeClr>
     </dgm:linClrLst>
     <dgm:effectClrLst/>
     <dgm:txLinClrLst/>
@@ -388,135 +402,7 @@
   </dgm:styleLbl>
   <dgm:styleLbl name="callout">
     <dgm:fillClrLst meth="repeat">
-      <a:schemeClr val="accent2"/>
-    </dgm:fillClrLst>
-    <dgm:linClrLst meth="repeat">
-      <a:schemeClr val="accent2">
-        <a:tint val="50000"/>
-      </a:schemeClr>
-    </dgm:linClrLst>
-    <dgm:effectClrLst/>
-    <dgm:txLinClrLst/>
-    <dgm:txFillClrLst meth="repeat">
-      <a:schemeClr val="tx1"/>
-    </dgm:txFillClrLst>
-    <dgm:txEffectClrLst/>
-  </dgm:styleLbl>
-  <dgm:styleLbl name="asst0">
-    <dgm:fillClrLst meth="repeat">
       <a:schemeClr val="accent1"/>
-    </dgm:fillClrLst>
-    <dgm:linClrLst meth="repeat">
-      <a:schemeClr val="lt1"/>
-    </dgm:linClrLst>
-    <dgm:effectClrLst/>
-    <dgm:txLinClrLst/>
-    <dgm:txFillClrLst/>
-    <dgm:txEffectClrLst/>
-  </dgm:styleLbl>
-  <dgm:styleLbl name="asst1">
-    <dgm:fillClrLst meth="repeat">
-      <a:schemeClr val="accent2"/>
-    </dgm:fillClrLst>
-    <dgm:linClrLst meth="repeat">
-      <a:schemeClr val="lt1"/>
-    </dgm:linClrLst>
-    <dgm:effectClrLst/>
-    <dgm:txLinClrLst/>
-    <dgm:txFillClrLst/>
-    <dgm:txEffectClrLst/>
-  </dgm:styleLbl>
-  <dgm:styleLbl name="asst2">
-    <dgm:fillClrLst>
-      <a:schemeClr val="accent3"/>
-    </dgm:fillClrLst>
-    <dgm:linClrLst meth="repeat">
-      <a:schemeClr val="lt1"/>
-    </dgm:linClrLst>
-    <dgm:effectClrLst/>
-    <dgm:txLinClrLst/>
-    <dgm:txFillClrLst/>
-    <dgm:txEffectClrLst/>
-  </dgm:styleLbl>
-  <dgm:styleLbl name="asst3">
-    <dgm:fillClrLst>
-      <a:schemeClr val="accent4"/>
-    </dgm:fillClrLst>
-    <dgm:linClrLst meth="repeat">
-      <a:schemeClr val="lt1"/>
-    </dgm:linClrLst>
-    <dgm:effectClrLst/>
-    <dgm:txLinClrLst/>
-    <dgm:txFillClrLst/>
-    <dgm:txEffectClrLst/>
-  </dgm:styleLbl>
-  <dgm:styleLbl name="asst4">
-    <dgm:fillClrLst>
-      <a:schemeClr val="accent5"/>
-    </dgm:fillClrLst>
-    <dgm:linClrLst meth="repeat">
-      <a:schemeClr val="lt1"/>
-    </dgm:linClrLst>
-    <dgm:effectClrLst/>
-    <dgm:txLinClrLst/>
-    <dgm:txFillClrLst/>
-    <dgm:txEffectClrLst/>
-  </dgm:styleLbl>
-  <dgm:styleLbl name="parChTrans2D1">
-    <dgm:fillClrLst meth="repeat">
-      <a:schemeClr val="accent2"/>
-    </dgm:fillClrLst>
-    <dgm:linClrLst meth="repeat">
-      <a:schemeClr val="lt1"/>
-    </dgm:linClrLst>
-    <dgm:effectClrLst/>
-    <dgm:txLinClrLst/>
-    <dgm:txFillClrLst meth="repeat">
-      <a:schemeClr val="lt1"/>
-    </dgm:txFillClrLst>
-    <dgm:txEffectClrLst/>
-  </dgm:styleLbl>
-  <dgm:styleLbl name="parChTrans2D2">
-    <dgm:fillClrLst meth="repeat">
-      <a:schemeClr val="accent3"/>
-    </dgm:fillClrLst>
-    <dgm:linClrLst meth="repeat">
-      <a:schemeClr val="lt1"/>
-    </dgm:linClrLst>
-    <dgm:effectClrLst/>
-    <dgm:txLinClrLst/>
-    <dgm:txFillClrLst/>
-    <dgm:txEffectClrLst/>
-  </dgm:styleLbl>
-  <dgm:styleLbl name="parChTrans2D3">
-    <dgm:fillClrLst meth="repeat">
-      <a:schemeClr val="accent4"/>
-    </dgm:fillClrLst>
-    <dgm:linClrLst meth="repeat">
-      <a:schemeClr val="lt1"/>
-    </dgm:linClrLst>
-    <dgm:effectClrLst/>
-    <dgm:txLinClrLst/>
-    <dgm:txFillClrLst/>
-    <dgm:txEffectClrLst/>
-  </dgm:styleLbl>
-  <dgm:styleLbl name="parChTrans2D4">
-    <dgm:fillClrLst meth="repeat">
-      <a:schemeClr val="accent5"/>
-    </dgm:fillClrLst>
-    <dgm:linClrLst meth="repeat">
-      <a:schemeClr val="lt1"/>
-    </dgm:linClrLst>
-    <dgm:effectClrLst/>
-    <dgm:txLinClrLst/>
-    <dgm:txFillClrLst meth="repeat">
-      <a:schemeClr val="lt1"/>
-    </dgm:txFillClrLst>
-    <dgm:txEffectClrLst/>
-  </dgm:styleLbl>
-  <dgm:styleLbl name="parChTrans1D1">
-    <dgm:fillClrLst meth="repeat">
-      <a:schemeClr val="accent2"/>
     </dgm:fillClrLst>
     <dgm:linClrLst meth="repeat">
       <a:schemeClr val="accent1"/>
@@ -528,14 +414,152 @@
     </dgm:txFillClrLst>
     <dgm:txEffectClrLst/>
   </dgm:styleLbl>
-  <dgm:styleLbl name="parChTrans1D2">
+  <dgm:styleLbl name="asst0">
     <dgm:fillClrLst meth="repeat">
-      <a:schemeClr val="accent3">
-        <a:tint val="90000"/>
+      <a:schemeClr val="accent1">
+        <a:alpha val="90000"/>
       </a:schemeClr>
     </dgm:fillClrLst>
     <dgm:linClrLst meth="repeat">
-      <a:schemeClr val="accent2"/>
+      <a:schemeClr val="lt1"/>
+    </dgm:linClrLst>
+    <dgm:effectClrLst/>
+    <dgm:txLinClrLst/>
+    <dgm:txFillClrLst/>
+    <dgm:txEffectClrLst/>
+  </dgm:styleLbl>
+  <dgm:styleLbl name="asst1">
+    <dgm:fillClrLst meth="repeat">
+      <a:schemeClr val="accent1">
+        <a:alpha val="90000"/>
+      </a:schemeClr>
+    </dgm:fillClrLst>
+    <dgm:linClrLst meth="repeat">
+      <a:schemeClr val="lt1"/>
+    </dgm:linClrLst>
+    <dgm:effectClrLst/>
+    <dgm:txLinClrLst/>
+    <dgm:txFillClrLst/>
+    <dgm:txEffectClrLst/>
+  </dgm:styleLbl>
+  <dgm:styleLbl name="asst2">
+    <dgm:fillClrLst>
+      <a:schemeClr val="accent1">
+        <a:alpha val="90000"/>
+      </a:schemeClr>
+    </dgm:fillClrLst>
+    <dgm:linClrLst meth="repeat">
+      <a:schemeClr val="lt1"/>
+    </dgm:linClrLst>
+    <dgm:effectClrLst/>
+    <dgm:txLinClrLst/>
+    <dgm:txFillClrLst/>
+    <dgm:txEffectClrLst/>
+  </dgm:styleLbl>
+  <dgm:styleLbl name="asst3">
+    <dgm:fillClrLst>
+      <a:schemeClr val="accent1">
+        <a:alpha val="70000"/>
+      </a:schemeClr>
+    </dgm:fillClrLst>
+    <dgm:linClrLst meth="repeat">
+      <a:schemeClr val="lt1"/>
+    </dgm:linClrLst>
+    <dgm:effectClrLst/>
+    <dgm:txLinClrLst/>
+    <dgm:txFillClrLst/>
+    <dgm:txEffectClrLst/>
+  </dgm:styleLbl>
+  <dgm:styleLbl name="asst4">
+    <dgm:fillClrLst>
+      <a:schemeClr val="accent1">
+        <a:alpha val="50000"/>
+      </a:schemeClr>
+    </dgm:fillClrLst>
+    <dgm:linClrLst meth="repeat">
+      <a:schemeClr val="lt1"/>
+    </dgm:linClrLst>
+    <dgm:effectClrLst/>
+    <dgm:txLinClrLst/>
+    <dgm:txFillClrLst/>
+    <dgm:txEffectClrLst/>
+  </dgm:styleLbl>
+  <dgm:styleLbl name="parChTrans2D1">
+    <dgm:fillClrLst meth="repeat">
+      <a:schemeClr val="accent1">
+        <a:shade val="80000"/>
+      </a:schemeClr>
+    </dgm:fillClrLst>
+    <dgm:linClrLst meth="repeat">
+      <a:schemeClr val="accent1">
+        <a:shade val="80000"/>
+      </a:schemeClr>
+    </dgm:linClrLst>
+    <dgm:effectClrLst/>
+    <dgm:txLinClrLst/>
+    <dgm:txFillClrLst/>
+    <dgm:txEffectClrLst/>
+  </dgm:styleLbl>
+  <dgm:styleLbl name="parChTrans2D2">
+    <dgm:fillClrLst meth="repeat">
+      <a:schemeClr val="accent1">
+        <a:tint val="90000"/>
+      </a:schemeClr>
+    </dgm:fillClrLst>
+    <dgm:linClrLst meth="repeat">
+      <a:schemeClr val="accent1">
+        <a:tint val="90000"/>
+      </a:schemeClr>
+    </dgm:linClrLst>
+    <dgm:effectClrLst/>
+    <dgm:txLinClrLst/>
+    <dgm:txFillClrLst/>
+    <dgm:txEffectClrLst/>
+  </dgm:styleLbl>
+  <dgm:styleLbl name="parChTrans2D3">
+    <dgm:fillClrLst meth="repeat">
+      <a:schemeClr val="accent1">
+        <a:tint val="70000"/>
+      </a:schemeClr>
+    </dgm:fillClrLst>
+    <dgm:linClrLst meth="repeat">
+      <a:schemeClr val="accent1">
+        <a:tint val="70000"/>
+      </a:schemeClr>
+    </dgm:linClrLst>
+    <dgm:effectClrLst/>
+    <dgm:txLinClrLst/>
+    <dgm:txFillClrLst/>
+    <dgm:txEffectClrLst/>
+  </dgm:styleLbl>
+  <dgm:styleLbl name="parChTrans2D4">
+    <dgm:fillClrLst meth="repeat">
+      <a:schemeClr val="accent1">
+        <a:tint val="50000"/>
+      </a:schemeClr>
+    </dgm:fillClrLst>
+    <dgm:linClrLst meth="repeat">
+      <a:schemeClr val="accent1">
+        <a:tint val="50000"/>
+      </a:schemeClr>
+    </dgm:linClrLst>
+    <dgm:effectClrLst/>
+    <dgm:txLinClrLst/>
+    <dgm:txFillClrLst meth="repeat">
+      <a:schemeClr val="dk1"/>
+    </dgm:txFillClrLst>
+    <dgm:txEffectClrLst/>
+  </dgm:styleLbl>
+  <dgm:styleLbl name="parChTrans1D1">
+    <dgm:fillClrLst meth="repeat">
+      <a:schemeClr val="accent1">
+        <a:shade val="80000"/>
+      </a:schemeClr>
+    </dgm:fillClrLst>
+    <dgm:linClrLst meth="repeat">
+      <a:schemeClr val="accent1">
+        <a:shade val="80000"/>
+      </a:schemeClr>
     </dgm:linClrLst>
     <dgm:effectClrLst/>
     <dgm:txLinClrLst/>
@@ -544,14 +568,16 @@
     </dgm:txFillClrLst>
     <dgm:txEffectClrLst/>
   </dgm:styleLbl>
-  <dgm:styleLbl name="parChTrans1D3">
+  <dgm:styleLbl name="parChTrans1D2">
     <dgm:fillClrLst meth="repeat">
-      <a:schemeClr val="accent4">
-        <a:tint val="70000"/>
+      <a:schemeClr val="accent1">
+        <a:tint val="90000"/>
       </a:schemeClr>
     </dgm:fillClrLst>
     <dgm:linClrLst meth="repeat">
-      <a:schemeClr val="accent3"/>
+      <a:schemeClr val="accent1">
+        <a:tint val="90000"/>
+      </a:schemeClr>
     </dgm:linClrLst>
     <dgm:effectClrLst/>
     <dgm:txLinClrLst/>
@@ -560,14 +586,16 @@
     </dgm:txFillClrLst>
     <dgm:txEffectClrLst/>
   </dgm:styleLbl>
-  <dgm:styleLbl name="parChTrans1D4">
+  <dgm:styleLbl name="parChTrans1D3">
     <dgm:fillClrLst meth="repeat">
-      <a:schemeClr val="accent5">
-        <a:tint val="50000"/>
+      <a:schemeClr val="accent1">
+        <a:tint val="70000"/>
       </a:schemeClr>
     </dgm:fillClrLst>
     <dgm:linClrLst meth="repeat">
-      <a:schemeClr val="accent4"/>
+      <a:schemeClr val="accent1">
+        <a:tint val="70000"/>
+      </a:schemeClr>
     </dgm:linClrLst>
     <dgm:effectClrLst/>
     <dgm:txLinClrLst/>
@@ -576,18 +604,37 @@
     </dgm:txFillClrLst>
     <dgm:txEffectClrLst/>
   </dgm:styleLbl>
+  <dgm:styleLbl name="parChTrans1D4">
+    <dgm:fillClrLst meth="repeat">
+      <a:schemeClr val="accent1">
+        <a:tint val="50000"/>
+      </a:schemeClr>
+    </dgm:fillClrLst>
+    <dgm:linClrLst meth="repeat">
+      <a:schemeClr val="accent1">
+        <a:tint val="50000"/>
+      </a:schemeClr>
+    </dgm:linClrLst>
+    <dgm:effectClrLst/>
+    <dgm:txLinClrLst/>
+    <dgm:txFillClrLst meth="repeat">
+      <a:schemeClr val="tx1"/>
+    </dgm:txFillClrLst>
+    <dgm:txEffectClrLst/>
+  </dgm:styleLbl>
   <dgm:styleLbl name="fgAcc1">
     <dgm:fillClrLst meth="repeat">
       <a:schemeClr val="lt1">
         <a:alpha val="90000"/>
       </a:schemeClr>
     </dgm:fillClrLst>
-    <dgm:linClrLst meth="repeat">
-      <a:schemeClr val="accent2"/>
-      <a:schemeClr val="accent3"/>
-      <a:schemeClr val="accent4"/>
-      <a:schemeClr val="accent5"/>
-      <a:schemeClr val="accent6"/>
+    <dgm:linClrLst>
+      <a:schemeClr val="accent1">
+        <a:alpha val="90000"/>
+      </a:schemeClr>
+      <a:schemeClr val="accent1">
+        <a:alpha val="50000"/>
+      </a:schemeClr>
     </dgm:linClrLst>
     <dgm:effectClrLst/>
     <dgm:txLinClrLst/>
@@ -602,12 +649,13 @@
         <a:alpha val="90000"/>
       </a:schemeClr>
     </dgm:fillClrLst>
-    <dgm:linClrLst meth="repeat">
-      <a:schemeClr val="accent2"/>
-      <a:schemeClr val="accent3"/>
-      <a:schemeClr val="accent4"/>
-      <a:schemeClr val="accent5"/>
-      <a:schemeClr val="accent6"/>
+    <dgm:linClrLst>
+      <a:schemeClr val="accent1">
+        <a:alpha val="90000"/>
+      </a:schemeClr>
+      <a:schemeClr val="accent1">
+        <a:alpha val="50000"/>
+      </a:schemeClr>
     </dgm:linClrLst>
     <dgm:effectClrLst/>
     <dgm:txLinClrLst/>
@@ -622,12 +670,13 @@
         <a:alpha val="90000"/>
       </a:schemeClr>
     </dgm:fillClrLst>
-    <dgm:linClrLst meth="repeat">
-      <a:schemeClr val="accent2"/>
-      <a:schemeClr val="accent3"/>
-      <a:schemeClr val="accent4"/>
-      <a:schemeClr val="accent5"/>
-      <a:schemeClr val="accent6"/>
+    <dgm:linClrLst>
+      <a:schemeClr val="accent1">
+        <a:alpha val="90000"/>
+      </a:schemeClr>
+      <a:schemeClr val="accent1">
+        <a:alpha val="50000"/>
+      </a:schemeClr>
     </dgm:linClrLst>
     <dgm:effectClrLst/>
     <dgm:txLinClrLst/>
@@ -641,6 +690,65 @@
       <a:schemeClr val="lt1">
         <a:alpha val="40000"/>
       </a:schemeClr>
+    </dgm:fillClrLst>
+    <dgm:linClrLst>
+      <a:schemeClr val="accent1">
+        <a:alpha val="90000"/>
+      </a:schemeClr>
+      <a:schemeClr val="accent1">
+        <a:alpha val="50000"/>
+      </a:schemeClr>
+    </dgm:linClrLst>
+    <dgm:effectClrLst/>
+    <dgm:txLinClrLst/>
+    <dgm:txFillClrLst meth="repeat">
+      <a:schemeClr val="dk1"/>
+    </dgm:txFillClrLst>
+    <dgm:txEffectClrLst/>
+  </dgm:styleLbl>
+  <dgm:styleLbl name="bgAcc1">
+    <dgm:fillClrLst meth="repeat">
+      <a:schemeClr val="lt1">
+        <a:alpha val="90000"/>
+      </a:schemeClr>
+    </dgm:fillClrLst>
+    <dgm:linClrLst>
+      <a:schemeClr val="accent1">
+        <a:alpha val="90000"/>
+      </a:schemeClr>
+      <a:schemeClr val="accent1">
+        <a:alpha val="50000"/>
+      </a:schemeClr>
+    </dgm:linClrLst>
+    <dgm:effectClrLst/>
+    <dgm:txLinClrLst/>
+    <dgm:txFillClrLst meth="repeat">
+      <a:schemeClr val="dk1"/>
+    </dgm:txFillClrLst>
+    <dgm:txEffectClrLst/>
+  </dgm:styleLbl>
+  <dgm:styleLbl name="solidFgAcc1">
+    <dgm:fillClrLst meth="repeat">
+      <a:schemeClr val="lt1"/>
+    </dgm:fillClrLst>
+    <dgm:linClrLst>
+      <a:schemeClr val="accent1">
+        <a:alpha val="90000"/>
+      </a:schemeClr>
+      <a:schemeClr val="accent1">
+        <a:alpha val="50000"/>
+      </a:schemeClr>
+    </dgm:linClrLst>
+    <dgm:effectClrLst/>
+    <dgm:txLinClrLst/>
+    <dgm:txFillClrLst meth="repeat">
+      <a:schemeClr val="dk1"/>
+    </dgm:txFillClrLst>
+    <dgm:txEffectClrLst/>
+  </dgm:styleLbl>
+  <dgm:styleLbl name="solidAlignAcc1">
+    <dgm:fillClrLst meth="repeat">
+      <a:schemeClr val="lt1"/>
     </dgm:fillClrLst>
     <dgm:linClrLst meth="repeat">
       <a:schemeClr val="accent1"/>
@@ -652,243 +760,11 @@
     </dgm:txFillClrLst>
     <dgm:txEffectClrLst/>
   </dgm:styleLbl>
-  <dgm:styleLbl name="bgAcc1">
-    <dgm:fillClrLst meth="repeat">
-      <a:schemeClr val="lt1">
-        <a:alpha val="90000"/>
-      </a:schemeClr>
-    </dgm:fillClrLst>
-    <dgm:linClrLst meth="repeat">
-      <a:schemeClr val="accent2"/>
-      <a:schemeClr val="accent3"/>
-      <a:schemeClr val="accent4"/>
-      <a:schemeClr val="accent5"/>
-      <a:schemeClr val="accent6"/>
-    </dgm:linClrLst>
-    <dgm:effectClrLst/>
-    <dgm:txLinClrLst/>
-    <dgm:txFillClrLst meth="repeat">
-      <a:schemeClr val="dk1"/>
-    </dgm:txFillClrLst>
-    <dgm:txEffectClrLst/>
-  </dgm:styleLbl>
-  <dgm:styleLbl name="solidFgAcc1">
-    <dgm:fillClrLst meth="repeat">
-      <a:schemeClr val="lt1"/>
-    </dgm:fillClrLst>
-    <dgm:linClrLst meth="repeat">
-      <a:schemeClr val="accent2"/>
-      <a:schemeClr val="accent3"/>
-      <a:schemeClr val="accent4"/>
-      <a:schemeClr val="accent5"/>
-      <a:schemeClr val="accent6"/>
-    </dgm:linClrLst>
-    <dgm:effectClrLst/>
-    <dgm:txLinClrLst/>
-    <dgm:txFillClrLst meth="repeat">
-      <a:schemeClr val="dk1"/>
-    </dgm:txFillClrLst>
-    <dgm:txEffectClrLst/>
-  </dgm:styleLbl>
-  <dgm:styleLbl name="solidAlignAcc1">
-    <dgm:fillClrLst meth="repeat">
-      <a:schemeClr val="lt1"/>
-    </dgm:fillClrLst>
-    <dgm:linClrLst meth="repeat">
-      <a:schemeClr val="accent2"/>
-      <a:schemeClr val="accent3"/>
-      <a:schemeClr val="accent4"/>
-      <a:schemeClr val="accent5"/>
-      <a:schemeClr val="accent6"/>
-    </dgm:linClrLst>
-    <dgm:effectClrLst/>
-    <dgm:txLinClrLst/>
-    <dgm:txFillClrLst meth="repeat">
-      <a:schemeClr val="dk1"/>
-    </dgm:txFillClrLst>
-    <dgm:txEffectClrLst/>
-  </dgm:styleLbl>
   <dgm:styleLbl name="solidBgAcc1">
     <dgm:fillClrLst meth="repeat">
       <a:schemeClr val="lt1"/>
     </dgm:fillClrLst>
     <dgm:linClrLst meth="repeat">
-      <a:schemeClr val="accent2"/>
-      <a:schemeClr val="accent3"/>
-      <a:schemeClr val="accent4"/>
-      <a:schemeClr val="accent5"/>
-      <a:schemeClr val="accent6"/>
-    </dgm:linClrLst>
-    <dgm:effectClrLst/>
-    <dgm:txLinClrLst/>
-    <dgm:txFillClrLst meth="repeat">
-      <a:schemeClr val="dk1"/>
-    </dgm:txFillClrLst>
-    <dgm:txEffectClrLst/>
-  </dgm:styleLbl>
-  <dgm:styleLbl name="fgAccFollowNode1">
-    <dgm:fillClrLst meth="repeat">
-      <a:schemeClr val="accent2">
-        <a:tint val="40000"/>
-        <a:alpha val="90000"/>
-      </a:schemeClr>
-      <a:schemeClr val="accent3">
-        <a:tint val="40000"/>
-        <a:alpha val="90000"/>
-      </a:schemeClr>
-      <a:schemeClr val="accent4">
-        <a:tint val="40000"/>
-        <a:alpha val="90000"/>
-      </a:schemeClr>
-      <a:schemeClr val="accent5">
-        <a:tint val="40000"/>
-        <a:alpha val="90000"/>
-      </a:schemeClr>
-      <a:schemeClr val="accent6">
-        <a:tint val="40000"/>
-        <a:alpha val="90000"/>
-      </a:schemeClr>
-    </dgm:fillClrLst>
-    <dgm:linClrLst meth="repeat">
-      <a:schemeClr val="accent2">
-        <a:tint val="40000"/>
-        <a:alpha val="90000"/>
-      </a:schemeClr>
-      <a:schemeClr val="accent3">
-        <a:tint val="40000"/>
-        <a:alpha val="90000"/>
-      </a:schemeClr>
-      <a:schemeClr val="accent4">
-        <a:tint val="40000"/>
-        <a:alpha val="90000"/>
-      </a:schemeClr>
-      <a:schemeClr val="accent5">
-        <a:tint val="40000"/>
-        <a:alpha val="90000"/>
-      </a:schemeClr>
-      <a:schemeClr val="accent6">
-        <a:tint val="40000"/>
-        <a:alpha val="90000"/>
-      </a:schemeClr>
-    </dgm:linClrLst>
-    <dgm:effectClrLst/>
-    <dgm:txLinClrLst/>
-    <dgm:txFillClrLst meth="repeat">
-      <a:schemeClr val="dk1"/>
-    </dgm:txFillClrLst>
-    <dgm:txEffectClrLst/>
-  </dgm:styleLbl>
-  <dgm:styleLbl name="alignAccFollowNode1">
-    <dgm:fillClrLst meth="repeat">
-      <a:schemeClr val="accent2">
-        <a:tint val="40000"/>
-        <a:alpha val="90000"/>
-      </a:schemeClr>
-      <a:schemeClr val="accent3">
-        <a:tint val="40000"/>
-        <a:alpha val="90000"/>
-      </a:schemeClr>
-      <a:schemeClr val="accent4">
-        <a:tint val="40000"/>
-        <a:alpha val="90000"/>
-      </a:schemeClr>
-      <a:schemeClr val="accent5">
-        <a:tint val="40000"/>
-        <a:alpha val="90000"/>
-      </a:schemeClr>
-      <a:schemeClr val="accent6">
-        <a:tint val="40000"/>
-        <a:alpha val="90000"/>
-      </a:schemeClr>
-    </dgm:fillClrLst>
-    <dgm:linClrLst meth="repeat">
-      <a:schemeClr val="accent2">
-        <a:tint val="40000"/>
-        <a:alpha val="90000"/>
-      </a:schemeClr>
-      <a:schemeClr val="accent3">
-        <a:tint val="40000"/>
-        <a:alpha val="90000"/>
-      </a:schemeClr>
-      <a:schemeClr val="accent4">
-        <a:tint val="40000"/>
-        <a:alpha val="90000"/>
-      </a:schemeClr>
-      <a:schemeClr val="accent5">
-        <a:tint val="40000"/>
-        <a:alpha val="90000"/>
-      </a:schemeClr>
-      <a:schemeClr val="accent6">
-        <a:tint val="40000"/>
-        <a:alpha val="90000"/>
-      </a:schemeClr>
-    </dgm:linClrLst>
-    <dgm:effectClrLst/>
-    <dgm:txLinClrLst/>
-    <dgm:txFillClrLst meth="repeat">
-      <a:schemeClr val="dk1"/>
-    </dgm:txFillClrLst>
-    <dgm:txEffectClrLst/>
-  </dgm:styleLbl>
-  <dgm:styleLbl name="bgAccFollowNode1">
-    <dgm:fillClrLst meth="repeat">
-      <a:schemeClr val="accent2">
-        <a:tint val="40000"/>
-        <a:alpha val="90000"/>
-      </a:schemeClr>
-      <a:schemeClr val="accent3">
-        <a:tint val="40000"/>
-        <a:alpha val="90000"/>
-      </a:schemeClr>
-      <a:schemeClr val="accent4">
-        <a:tint val="40000"/>
-        <a:alpha val="90000"/>
-      </a:schemeClr>
-      <a:schemeClr val="accent5">
-        <a:tint val="40000"/>
-        <a:alpha val="90000"/>
-      </a:schemeClr>
-      <a:schemeClr val="accent6">
-        <a:tint val="40000"/>
-        <a:alpha val="90000"/>
-      </a:schemeClr>
-    </dgm:fillClrLst>
-    <dgm:linClrLst meth="repeat">
-      <a:schemeClr val="accent2">
-        <a:tint val="40000"/>
-        <a:alpha val="90000"/>
-      </a:schemeClr>
-      <a:schemeClr val="accent3">
-        <a:tint val="40000"/>
-        <a:alpha val="90000"/>
-      </a:schemeClr>
-      <a:schemeClr val="accent4">
-        <a:tint val="40000"/>
-        <a:alpha val="90000"/>
-      </a:schemeClr>
-      <a:schemeClr val="accent5">
-        <a:tint val="40000"/>
-        <a:alpha val="90000"/>
-      </a:schemeClr>
-      <a:schemeClr val="accent6">
-        <a:tint val="40000"/>
-        <a:alpha val="90000"/>
-      </a:schemeClr>
-    </dgm:linClrLst>
-    <dgm:effectClrLst/>
-    <dgm:txLinClrLst/>
-    <dgm:txFillClrLst meth="repeat">
-      <a:schemeClr val="dk1"/>
-    </dgm:txFillClrLst>
-    <dgm:txEffectClrLst/>
-  </dgm:styleLbl>
-  <dgm:styleLbl name="fgAcc0">
-    <dgm:fillClrLst meth="repeat">
-      <a:schemeClr val="lt1">
-        <a:alpha val="90000"/>
-      </a:schemeClr>
-    </dgm:fillClrLst>
-    <dgm:linClrLst>
       <a:schemeClr val="accent1"/>
     </dgm:linClrLst>
     <dgm:effectClrLst/>
@@ -898,14 +774,22 @@
     </dgm:txFillClrLst>
     <dgm:txEffectClrLst/>
   </dgm:styleLbl>
-  <dgm:styleLbl name="fgAcc2">
-    <dgm:fillClrLst meth="repeat">
-      <a:schemeClr val="lt1">
+  <dgm:styleLbl name="fgAccFollowNode1">
+    <dgm:fillClrLst>
+      <a:schemeClr val="accent1">
         <a:alpha val="90000"/>
+        <a:tint val="40000"/>
+      </a:schemeClr>
+      <a:schemeClr val="accent1">
+        <a:alpha val="50000"/>
+        <a:tint val="40000"/>
       </a:schemeClr>
     </dgm:fillClrLst>
-    <dgm:linClrLst>
-      <a:schemeClr val="accent2"/>
+    <dgm:linClrLst meth="repeat">
+      <a:schemeClr val="accent1">
+        <a:alpha val="90000"/>
+        <a:tint val="40000"/>
+      </a:schemeClr>
     </dgm:linClrLst>
     <dgm:effectClrLst/>
     <dgm:txLinClrLst/>
@@ -914,14 +798,18 @@
     </dgm:txFillClrLst>
     <dgm:txEffectClrLst/>
   </dgm:styleLbl>
-  <dgm:styleLbl name="fgAcc3">
+  <dgm:styleLbl name="alignAccFollowNode1">
     <dgm:fillClrLst meth="repeat">
-      <a:schemeClr val="lt1">
+      <a:schemeClr val="accent1">
         <a:alpha val="90000"/>
+        <a:tint val="40000"/>
       </a:schemeClr>
     </dgm:fillClrLst>
-    <dgm:linClrLst>
-      <a:schemeClr val="accent3"/>
+    <dgm:linClrLst meth="repeat">
+      <a:schemeClr val="accent1">
+        <a:alpha val="90000"/>
+        <a:tint val="40000"/>
+      </a:schemeClr>
     </dgm:linClrLst>
     <dgm:effectClrLst/>
     <dgm:txLinClrLst/>
@@ -930,14 +818,15 @@
     </dgm:txFillClrLst>
     <dgm:txEffectClrLst/>
   </dgm:styleLbl>
-  <dgm:styleLbl name="fgAcc4">
+  <dgm:styleLbl name="bgAccFollowNode1">
     <dgm:fillClrLst meth="repeat">
-      <a:schemeClr val="lt1">
+      <a:schemeClr val="accent1">
         <a:alpha val="90000"/>
+        <a:tint val="40000"/>
       </a:schemeClr>
     </dgm:fillClrLst>
-    <dgm:linClrLst>
-      <a:schemeClr val="accent4"/>
+    <dgm:linClrLst meth="repeat">
+      <a:schemeClr val="lt1"/>
     </dgm:linClrLst>
     <dgm:effectClrLst/>
     <dgm:txLinClrLst/>
@@ -946,9 +835,81 @@
     </dgm:txFillClrLst>
     <dgm:txEffectClrLst/>
   </dgm:styleLbl>
+  <dgm:styleLbl name="fgAcc0">
+    <dgm:fillClrLst meth="repeat">
+      <a:schemeClr val="lt1">
+        <a:alpha val="90000"/>
+      </a:schemeClr>
+    </dgm:fillClrLst>
+    <dgm:linClrLst meth="repeat">
+      <a:schemeClr val="accent1">
+        <a:shade val="80000"/>
+      </a:schemeClr>
+    </dgm:linClrLst>
+    <dgm:effectClrLst/>
+    <dgm:txLinClrLst/>
+    <dgm:txFillClrLst meth="repeat">
+      <a:schemeClr val="dk1"/>
+    </dgm:txFillClrLst>
+    <dgm:txEffectClrLst/>
+  </dgm:styleLbl>
+  <dgm:styleLbl name="fgAcc2">
+    <dgm:fillClrLst meth="repeat">
+      <a:schemeClr val="lt1">
+        <a:alpha val="90000"/>
+      </a:schemeClr>
+    </dgm:fillClrLst>
+    <dgm:linClrLst meth="repeat">
+      <a:schemeClr val="accent1">
+        <a:tint val="90000"/>
+      </a:schemeClr>
+    </dgm:linClrLst>
+    <dgm:effectClrLst/>
+    <dgm:txLinClrLst/>
+    <dgm:txFillClrLst meth="repeat">
+      <a:schemeClr val="dk1"/>
+    </dgm:txFillClrLst>
+    <dgm:txEffectClrLst/>
+  </dgm:styleLbl>
+  <dgm:styleLbl name="fgAcc3">
+    <dgm:fillClrLst meth="repeat">
+      <a:schemeClr val="lt1">
+        <a:alpha val="90000"/>
+      </a:schemeClr>
+    </dgm:fillClrLst>
+    <dgm:linClrLst meth="repeat">
+      <a:schemeClr val="accent1">
+        <a:tint val="70000"/>
+      </a:schemeClr>
+    </dgm:linClrLst>
+    <dgm:effectClrLst/>
+    <dgm:txLinClrLst/>
+    <dgm:txFillClrLst meth="repeat">
+      <a:schemeClr val="dk1"/>
+    </dgm:txFillClrLst>
+    <dgm:txEffectClrLst/>
+  </dgm:styleLbl>
+  <dgm:styleLbl name="fgAcc4">
+    <dgm:fillClrLst meth="repeat">
+      <a:schemeClr val="lt1">
+        <a:alpha val="90000"/>
+      </a:schemeClr>
+    </dgm:fillClrLst>
+    <dgm:linClrLst meth="repeat">
+      <a:schemeClr val="accent1">
+        <a:tint val="50000"/>
+      </a:schemeClr>
+    </dgm:linClrLst>
+    <dgm:effectClrLst/>
+    <dgm:txLinClrLst/>
+    <dgm:txFillClrLst meth="repeat">
+      <a:schemeClr val="dk1"/>
+    </dgm:txFillClrLst>
+    <dgm:txEffectClrLst/>
+  </dgm:styleLbl>
   <dgm:styleLbl name="bgShp">
     <dgm:fillClrLst meth="repeat">
-      <a:schemeClr val="accent2">
+      <a:schemeClr val="accent1">
         <a:tint val="40000"/>
       </a:schemeClr>
     </dgm:fillClrLst>
@@ -964,7 +925,7 @@
   </dgm:styleLbl>
   <dgm:styleLbl name="dkBgShp">
     <dgm:fillClrLst meth="repeat">
-      <a:schemeClr val="accent2">
+      <a:schemeClr val="accent1">
         <a:shade val="90000"/>
       </a:schemeClr>
     </dgm:fillClrLst>
@@ -986,7 +947,7 @@
       </a:schemeClr>
     </dgm:fillClrLst>
     <dgm:linClrLst meth="repeat">
-      <a:schemeClr val="accent2"/>
+      <a:schemeClr val="accent1"/>
     </dgm:linClrLst>
     <dgm:effectClrLst/>
     <dgm:txLinClrLst/>
@@ -997,7 +958,7 @@
   </dgm:styleLbl>
   <dgm:styleLbl name="fgShp">
     <dgm:fillClrLst meth="repeat">
-      <a:schemeClr val="accent2">
+      <a:schemeClr val="accent1">
         <a:tint val="40000"/>
       </a:schemeClr>
     </dgm:fillClrLst>
@@ -1036,7 +997,7 @@
 <dgm:dataModel xmlns:dgm="http://schemas.openxmlformats.org/drawingml/2006/diagram" xmlns:a="http://schemas.openxmlformats.org/drawingml/2006/main">
   <dgm:ptLst>
     <dgm:pt modelId="{5FAC534C-CB27-4B9D-8CB1-94EE9C514430}" type="doc">
-      <dgm:prSet loTypeId="urn:microsoft.com/office/officeart/2005/8/layout/pyramid1" loCatId="pyramid" qsTypeId="urn:microsoft.com/office/officeart/2005/8/quickstyle/simple2" qsCatId="simple" csTypeId="urn:microsoft.com/office/officeart/2005/8/colors/colorful1" csCatId="colorful" phldr="1"/>
+      <dgm:prSet loTypeId="urn:microsoft.com/office/officeart/2005/8/layout/pyramid1" loCatId="pyramid" qsTypeId="urn:microsoft.com/office/officeart/2005/8/quickstyle/simple2" qsCatId="simple" csTypeId="urn:microsoft.com/office/officeart/2005/8/colors/accent1_5" csCatId="accent1" phldr="1"/>
       <dgm:spPr/>
     </dgm:pt>
     <dgm:pt modelId="{8EFDD0DE-D1C0-4EF3-95F7-2AF8EEB6D853}">
@@ -1147,42 +1108,6 @@
         </a:p>
       </dgm:t>
     </dgm:pt>
-    <dgm:pt modelId="{EBC2077D-C3A1-4D8B-B69C-66393E6BED4A}">
-      <dgm:prSet phldrT="[Text]" custT="1"/>
-      <dgm:spPr/>
-      <dgm:t>
-        <a:bodyPr/>
-        <a:lstStyle/>
-        <a:p>
-          <a:r>
-            <a:rPr lang="en-US" sz="4800" dirty="0"/>
-            <a:t>System</a:t>
-          </a:r>
-        </a:p>
-      </dgm:t>
-    </dgm:pt>
-    <dgm:pt modelId="{124D4F93-9F9E-4037-998D-96D8C25CAB93}" type="parTrans" cxnId="{E75181CA-B374-4D74-A374-CD931E7ABFE5}">
-      <dgm:prSet/>
-      <dgm:spPr/>
-      <dgm:t>
-        <a:bodyPr/>
-        <a:lstStyle/>
-        <a:p>
-          <a:endParaRPr lang="en-US"/>
-        </a:p>
-      </dgm:t>
-    </dgm:pt>
-    <dgm:pt modelId="{498302E7-DD14-40A2-95E2-3F925CDAE891}" type="sibTrans" cxnId="{E75181CA-B374-4D74-A374-CD931E7ABFE5}">
-      <dgm:prSet/>
-      <dgm:spPr/>
-      <dgm:t>
-        <a:bodyPr/>
-        <a:lstStyle/>
-        <a:p>
-          <a:endParaRPr lang="en-US"/>
-        </a:p>
-      </dgm:t>
-    </dgm:pt>
     <dgm:pt modelId="{455667BA-09D4-4626-8636-4EAC206AAD4D}" type="pres">
       <dgm:prSet presAssocID="{5FAC534C-CB27-4B9D-8CB1-94EE9C514430}" presName="Name0" presStyleCnt="0">
         <dgm:presLayoutVars>
@@ -1198,7 +1123,7 @@
       <dgm:spPr/>
     </dgm:pt>
     <dgm:pt modelId="{7D010D88-EA5F-43C0-A747-3D0D1D94D614}" type="pres">
-      <dgm:prSet presAssocID="{8EFDD0DE-D1C0-4EF3-95F7-2AF8EEB6D853}" presName="level" presStyleLbl="node1" presStyleIdx="0" presStyleCnt="4">
+      <dgm:prSet presAssocID="{8EFDD0DE-D1C0-4EF3-95F7-2AF8EEB6D853}" presName="level" presStyleLbl="node1" presStyleIdx="0" presStyleCnt="3">
         <dgm:presLayoutVars>
           <dgm:chMax val="1"/>
           <dgm:bulletEnabled val="1"/>
@@ -1215,34 +1140,12 @@
       </dgm:prSet>
       <dgm:spPr/>
     </dgm:pt>
-    <dgm:pt modelId="{5D62FF2E-99E6-4CC7-809F-8567FD13AC8E}" type="pres">
-      <dgm:prSet presAssocID="{EBC2077D-C3A1-4D8B-B69C-66393E6BED4A}" presName="Name8" presStyleCnt="0"/>
-      <dgm:spPr/>
-    </dgm:pt>
-    <dgm:pt modelId="{9CF9FF3D-C980-4910-AC3D-1953F9A24059}" type="pres">
-      <dgm:prSet presAssocID="{EBC2077D-C3A1-4D8B-B69C-66393E6BED4A}" presName="level" presStyleLbl="node1" presStyleIdx="1" presStyleCnt="4">
-        <dgm:presLayoutVars>
-          <dgm:chMax val="1"/>
-          <dgm:bulletEnabled val="1"/>
-        </dgm:presLayoutVars>
-      </dgm:prSet>
-      <dgm:spPr/>
-    </dgm:pt>
-    <dgm:pt modelId="{3EA01657-FA5F-44B3-BE21-A6179BD31D29}" type="pres">
-      <dgm:prSet presAssocID="{EBC2077D-C3A1-4D8B-B69C-66393E6BED4A}" presName="levelTx" presStyleLbl="revTx" presStyleIdx="0" presStyleCnt="0">
-        <dgm:presLayoutVars>
-          <dgm:chMax val="1"/>
-          <dgm:bulletEnabled val="1"/>
-        </dgm:presLayoutVars>
-      </dgm:prSet>
-      <dgm:spPr/>
-    </dgm:pt>
     <dgm:pt modelId="{706D0F21-12D0-4B6E-B7D5-C8606591B46B}" type="pres">
       <dgm:prSet presAssocID="{F7BA000B-4275-47C3-8FC9-C6053E3A060B}" presName="Name8" presStyleCnt="0"/>
       <dgm:spPr/>
     </dgm:pt>
     <dgm:pt modelId="{787584E4-2AA0-449E-ACC8-BFCA17221B3B}" type="pres">
-      <dgm:prSet presAssocID="{F7BA000B-4275-47C3-8FC9-C6053E3A060B}" presName="level" presStyleLbl="node1" presStyleIdx="2" presStyleCnt="4">
+      <dgm:prSet presAssocID="{F7BA000B-4275-47C3-8FC9-C6053E3A060B}" presName="level" presStyleLbl="node1" presStyleIdx="1" presStyleCnt="3">
         <dgm:presLayoutVars>
           <dgm:chMax val="1"/>
           <dgm:bulletEnabled val="1"/>
@@ -1264,7 +1167,7 @@
       <dgm:spPr/>
     </dgm:pt>
     <dgm:pt modelId="{C3A67625-05F0-426C-81EF-E0F141AF6EDF}" type="pres">
-      <dgm:prSet presAssocID="{6E2976C2-0D73-4943-BB06-2188BC56A441}" presName="level" presStyleLbl="node1" presStyleIdx="3" presStyleCnt="4">
+      <dgm:prSet presAssocID="{6E2976C2-0D73-4943-BB06-2188BC56A441}" presName="level" presStyleLbl="node1" presStyleIdx="2" presStyleCnt="3">
         <dgm:presLayoutVars>
           <dgm:chMax val="1"/>
           <dgm:bulletEnabled val="1"/>
@@ -1283,29 +1186,23 @@
     </dgm:pt>
   </dgm:ptLst>
   <dgm:cxnLst>
-    <dgm:cxn modelId="{42DD970D-91BF-411F-9650-08B4CD735A11}" srcId="{5FAC534C-CB27-4B9D-8CB1-94EE9C514430}" destId="{6E2976C2-0D73-4943-BB06-2188BC56A441}" srcOrd="3" destOrd="0" parTransId="{D8A24376-6EC9-46D7-B03D-1D005628A19D}" sibTransId="{0A950322-B7B3-46B8-B4F3-24C7E5BEDF4F}"/>
+    <dgm:cxn modelId="{42DD970D-91BF-411F-9650-08B4CD735A11}" srcId="{5FAC534C-CB27-4B9D-8CB1-94EE9C514430}" destId="{6E2976C2-0D73-4943-BB06-2188BC56A441}" srcOrd="2" destOrd="0" parTransId="{D8A24376-6EC9-46D7-B03D-1D005628A19D}" sibTransId="{0A950322-B7B3-46B8-B4F3-24C7E5BEDF4F}"/>
     <dgm:cxn modelId="{91446D0F-37BC-4284-B98E-8C0925A19499}" type="presOf" srcId="{6E2976C2-0D73-4943-BB06-2188BC56A441}" destId="{AB134BAD-C02D-445A-9783-397FD73E2DC1}" srcOrd="1" destOrd="0" presId="urn:microsoft.com/office/officeart/2005/8/layout/pyramid1"/>
     <dgm:cxn modelId="{7AD9C510-E7C9-448E-BC1D-CA55C79EE706}" type="presOf" srcId="{6E2976C2-0D73-4943-BB06-2188BC56A441}" destId="{C3A67625-05F0-426C-81EF-E0F141AF6EDF}" srcOrd="0" destOrd="0" presId="urn:microsoft.com/office/officeart/2005/8/layout/pyramid1"/>
-    <dgm:cxn modelId="{1BA30115-4AF1-4DEA-A37A-37E091D7ADFB}" type="presOf" srcId="{EBC2077D-C3A1-4D8B-B69C-66393E6BED4A}" destId="{9CF9FF3D-C980-4910-AC3D-1953F9A24059}" srcOrd="0" destOrd="0" presId="urn:microsoft.com/office/officeart/2005/8/layout/pyramid1"/>
     <dgm:cxn modelId="{B8C5E120-13DE-48A6-9D36-785357A0EF83}" type="presOf" srcId="{5FAC534C-CB27-4B9D-8CB1-94EE9C514430}" destId="{455667BA-09D4-4626-8636-4EAC206AAD4D}" srcOrd="0" destOrd="0" presId="urn:microsoft.com/office/officeart/2005/8/layout/pyramid1"/>
     <dgm:cxn modelId="{8D3B9B32-F6E3-4272-8B53-C93F9A3C0E19}" type="presOf" srcId="{F7BA000B-4275-47C3-8FC9-C6053E3A060B}" destId="{E4CF5F01-5BB6-438F-941C-34676098E6A3}" srcOrd="1" destOrd="0" presId="urn:microsoft.com/office/officeart/2005/8/layout/pyramid1"/>
     <dgm:cxn modelId="{98504235-47E4-487C-8433-AC2B5E5B3C97}" type="presOf" srcId="{F7BA000B-4275-47C3-8FC9-C6053E3A060B}" destId="{787584E4-2AA0-449E-ACC8-BFCA17221B3B}" srcOrd="0" destOrd="0" presId="urn:microsoft.com/office/officeart/2005/8/layout/pyramid1"/>
-    <dgm:cxn modelId="{175DA18F-0277-4457-99DE-A003309BEAF6}" type="presOf" srcId="{EBC2077D-C3A1-4D8B-B69C-66393E6BED4A}" destId="{3EA01657-FA5F-44B3-BE21-A6179BD31D29}" srcOrd="1" destOrd="0" presId="urn:microsoft.com/office/officeart/2005/8/layout/pyramid1"/>
     <dgm:cxn modelId="{0D224794-9204-4F8E-AAD1-7FA364563C39}" type="presOf" srcId="{8EFDD0DE-D1C0-4EF3-95F7-2AF8EEB6D853}" destId="{7D010D88-EA5F-43C0-A747-3D0D1D94D614}" srcOrd="0" destOrd="0" presId="urn:microsoft.com/office/officeart/2005/8/layout/pyramid1"/>
     <dgm:cxn modelId="{88B7D894-D9DA-4D93-A877-375CD9C21480}" type="presOf" srcId="{8EFDD0DE-D1C0-4EF3-95F7-2AF8EEB6D853}" destId="{2AF62E6D-5D16-4B5E-92DF-626B43CD5D28}" srcOrd="1" destOrd="0" presId="urn:microsoft.com/office/officeart/2005/8/layout/pyramid1"/>
     <dgm:cxn modelId="{9D7736C1-C54C-4045-BC90-FAD74BB50DF2}" srcId="{5FAC534C-CB27-4B9D-8CB1-94EE9C514430}" destId="{8EFDD0DE-D1C0-4EF3-95F7-2AF8EEB6D853}" srcOrd="0" destOrd="0" parTransId="{E7897654-F97D-4F81-9659-08EB095B913B}" sibTransId="{16937C9D-9E9A-4B7C-A371-7BB895F7148A}"/>
-    <dgm:cxn modelId="{E75181CA-B374-4D74-A374-CD931E7ABFE5}" srcId="{5FAC534C-CB27-4B9D-8CB1-94EE9C514430}" destId="{EBC2077D-C3A1-4D8B-B69C-66393E6BED4A}" srcOrd="1" destOrd="0" parTransId="{124D4F93-9F9E-4037-998D-96D8C25CAB93}" sibTransId="{498302E7-DD14-40A2-95E2-3F925CDAE891}"/>
-    <dgm:cxn modelId="{93C0FEE0-B5E4-4831-9E46-86A01F11E16D}" srcId="{5FAC534C-CB27-4B9D-8CB1-94EE9C514430}" destId="{F7BA000B-4275-47C3-8FC9-C6053E3A060B}" srcOrd="2" destOrd="0" parTransId="{6ED150B2-0CA6-4D80-B57C-CDB5D51EBB85}" sibTransId="{62B98013-2AF0-435A-87BA-7AF7899165F1}"/>
+    <dgm:cxn modelId="{93C0FEE0-B5E4-4831-9E46-86A01F11E16D}" srcId="{5FAC534C-CB27-4B9D-8CB1-94EE9C514430}" destId="{F7BA000B-4275-47C3-8FC9-C6053E3A060B}" srcOrd="1" destOrd="0" parTransId="{6ED150B2-0CA6-4D80-B57C-CDB5D51EBB85}" sibTransId="{62B98013-2AF0-435A-87BA-7AF7899165F1}"/>
     <dgm:cxn modelId="{42640D3B-E91A-4B4B-99BE-2842D90D8E6B}" type="presParOf" srcId="{455667BA-09D4-4626-8636-4EAC206AAD4D}" destId="{3B290425-7025-4B53-BBD6-4C00E64A0970}" srcOrd="0" destOrd="0" presId="urn:microsoft.com/office/officeart/2005/8/layout/pyramid1"/>
     <dgm:cxn modelId="{5C670939-B0C5-49EF-B3BD-239814F959DE}" type="presParOf" srcId="{3B290425-7025-4B53-BBD6-4C00E64A0970}" destId="{7D010D88-EA5F-43C0-A747-3D0D1D94D614}" srcOrd="0" destOrd="0" presId="urn:microsoft.com/office/officeart/2005/8/layout/pyramid1"/>
     <dgm:cxn modelId="{63764836-D3E0-45E0-B4C9-2C78340FB9C6}" type="presParOf" srcId="{3B290425-7025-4B53-BBD6-4C00E64A0970}" destId="{2AF62E6D-5D16-4B5E-92DF-626B43CD5D28}" srcOrd="1" destOrd="0" presId="urn:microsoft.com/office/officeart/2005/8/layout/pyramid1"/>
-    <dgm:cxn modelId="{6C57C0E2-6AB3-49AD-97C4-B93809A226B7}" type="presParOf" srcId="{455667BA-09D4-4626-8636-4EAC206AAD4D}" destId="{5D62FF2E-99E6-4CC7-809F-8567FD13AC8E}" srcOrd="1" destOrd="0" presId="urn:microsoft.com/office/officeart/2005/8/layout/pyramid1"/>
-    <dgm:cxn modelId="{3C8075E4-3166-4530-A1E7-FB49061285D9}" type="presParOf" srcId="{5D62FF2E-99E6-4CC7-809F-8567FD13AC8E}" destId="{9CF9FF3D-C980-4910-AC3D-1953F9A24059}" srcOrd="0" destOrd="0" presId="urn:microsoft.com/office/officeart/2005/8/layout/pyramid1"/>
-    <dgm:cxn modelId="{ADC8627C-5D7C-4201-8F73-1A74EF9523FC}" type="presParOf" srcId="{5D62FF2E-99E6-4CC7-809F-8567FD13AC8E}" destId="{3EA01657-FA5F-44B3-BE21-A6179BD31D29}" srcOrd="1" destOrd="0" presId="urn:microsoft.com/office/officeart/2005/8/layout/pyramid1"/>
-    <dgm:cxn modelId="{6041A661-46FC-4C1A-A630-82C9EFBD1539}" type="presParOf" srcId="{455667BA-09D4-4626-8636-4EAC206AAD4D}" destId="{706D0F21-12D0-4B6E-B7D5-C8606591B46B}" srcOrd="2" destOrd="0" presId="urn:microsoft.com/office/officeart/2005/8/layout/pyramid1"/>
+    <dgm:cxn modelId="{6041A661-46FC-4C1A-A630-82C9EFBD1539}" type="presParOf" srcId="{455667BA-09D4-4626-8636-4EAC206AAD4D}" destId="{706D0F21-12D0-4B6E-B7D5-C8606591B46B}" srcOrd="1" destOrd="0" presId="urn:microsoft.com/office/officeart/2005/8/layout/pyramid1"/>
     <dgm:cxn modelId="{522A0B50-3B3A-4635-AC63-118CB08901B1}" type="presParOf" srcId="{706D0F21-12D0-4B6E-B7D5-C8606591B46B}" destId="{787584E4-2AA0-449E-ACC8-BFCA17221B3B}" srcOrd="0" destOrd="0" presId="urn:microsoft.com/office/officeart/2005/8/layout/pyramid1"/>
     <dgm:cxn modelId="{7D270A60-26E9-469C-AF5F-F5B25F49D5E7}" type="presParOf" srcId="{706D0F21-12D0-4B6E-B7D5-C8606591B46B}" destId="{E4CF5F01-5BB6-438F-941C-34676098E6A3}" srcOrd="1" destOrd="0" presId="urn:microsoft.com/office/officeart/2005/8/layout/pyramid1"/>
-    <dgm:cxn modelId="{A5B451E1-71CF-45A1-A75D-A5DC338647E8}" type="presParOf" srcId="{455667BA-09D4-4626-8636-4EAC206AAD4D}" destId="{7699A213-2A6F-43AC-BBFB-BE367AC3D6F4}" srcOrd="3" destOrd="0" presId="urn:microsoft.com/office/officeart/2005/8/layout/pyramid1"/>
+    <dgm:cxn modelId="{A5B451E1-71CF-45A1-A75D-A5DC338647E8}" type="presParOf" srcId="{455667BA-09D4-4626-8636-4EAC206AAD4D}" destId="{7699A213-2A6F-43AC-BBFB-BE367AC3D6F4}" srcOrd="2" destOrd="0" presId="urn:microsoft.com/office/officeart/2005/8/layout/pyramid1"/>
     <dgm:cxn modelId="{3C821ADF-97C5-4363-9133-8886C6582573}" type="presParOf" srcId="{7699A213-2A6F-43AC-BBFB-BE367AC3D6F4}" destId="{C3A67625-05F0-426C-81EF-E0F141AF6EDF}" srcOrd="0" destOrd="0" presId="urn:microsoft.com/office/officeart/2005/8/layout/pyramid1"/>
     <dgm:cxn modelId="{8F8B2296-F3F0-4176-B6BB-296147466447}" type="presParOf" srcId="{7699A213-2A6F-43AC-BBFB-BE367AC3D6F4}" destId="{AB134BAD-C02D-445A-9783-397FD73E2DC1}" srcOrd="1" destOrd="0" presId="urn:microsoft.com/office/officeart/2005/8/layout/pyramid1"/>
   </dgm:cxnLst>
@@ -1334,8 +1231,8 @@
       </dsp:nvSpPr>
       <dsp:spPr>
         <a:xfrm>
-          <a:off x="3087899" y="0"/>
-          <a:ext cx="2058599" cy="1354666"/>
+          <a:off x="2744799" y="0"/>
+          <a:ext cx="2744799" cy="1806222"/>
         </a:xfrm>
         <a:prstGeom prst="trapezoid">
           <a:avLst>
@@ -1343,7 +1240,8 @@
           </a:avLst>
         </a:prstGeom>
         <a:solidFill>
-          <a:schemeClr val="accent2">
+          <a:schemeClr val="accent1">
+            <a:alpha val="90000"/>
             <a:hueOff val="0"/>
             <a:satOff val="0"/>
             <a:lumOff val="0"/>
@@ -1403,88 +1301,8 @@
         </a:p>
       </dsp:txBody>
       <dsp:txXfrm>
-        <a:off x="3087899" y="0"/>
-        <a:ext cx="2058599" cy="1354666"/>
-      </dsp:txXfrm>
-    </dsp:sp>
-    <dsp:sp modelId="{9CF9FF3D-C980-4910-AC3D-1953F9A24059}">
-      <dsp:nvSpPr>
-        <dsp:cNvPr id="0" name=""/>
-        <dsp:cNvSpPr/>
-      </dsp:nvSpPr>
-      <dsp:spPr>
-        <a:xfrm>
-          <a:off x="2058599" y="1354666"/>
-          <a:ext cx="4117199" cy="1354666"/>
-        </a:xfrm>
-        <a:prstGeom prst="trapezoid">
-          <a:avLst>
-            <a:gd name="adj" fmla="val 75982"/>
-          </a:avLst>
-        </a:prstGeom>
-        <a:solidFill>
-          <a:schemeClr val="accent3">
-            <a:hueOff val="0"/>
-            <a:satOff val="0"/>
-            <a:lumOff val="0"/>
-            <a:alphaOff val="0"/>
-          </a:schemeClr>
-        </a:solidFill>
-        <a:ln w="19050" cap="flat" cmpd="sng" algn="ctr">
-          <a:solidFill>
-            <a:schemeClr val="lt1">
-              <a:hueOff val="0"/>
-              <a:satOff val="0"/>
-              <a:lumOff val="0"/>
-              <a:alphaOff val="0"/>
-            </a:schemeClr>
-          </a:solidFill>
-          <a:prstDash val="solid"/>
-          <a:miter lim="800000"/>
-        </a:ln>
-        <a:effectLst/>
-      </dsp:spPr>
-      <dsp:style>
-        <a:lnRef idx="3">
-          <a:scrgbClr r="0" g="0" b="0"/>
-        </a:lnRef>
-        <a:fillRef idx="1">
-          <a:scrgbClr r="0" g="0" b="0"/>
-        </a:fillRef>
-        <a:effectRef idx="1">
-          <a:scrgbClr r="0" g="0" b="0"/>
-        </a:effectRef>
-        <a:fontRef idx="minor">
-          <a:schemeClr val="lt1"/>
-        </a:fontRef>
-      </dsp:style>
-      <dsp:txBody>
-        <a:bodyPr spcFirstLastPara="0" vert="horz" wrap="square" lIns="60960" tIns="60960" rIns="60960" bIns="60960" numCol="1" spcCol="1270" anchor="ctr" anchorCtr="0">
-          <a:noAutofit/>
-        </a:bodyPr>
-        <a:lstStyle/>
-        <a:p>
-          <a:pPr marL="0" lvl="0" indent="0" algn="ctr" defTabSz="2133600">
-            <a:lnSpc>
-              <a:spcPct val="90000"/>
-            </a:lnSpc>
-            <a:spcBef>
-              <a:spcPct val="0"/>
-            </a:spcBef>
-            <a:spcAft>
-              <a:spcPct val="35000"/>
-            </a:spcAft>
-            <a:buNone/>
-          </a:pPr>
-          <a:r>
-            <a:rPr lang="en-US" sz="4800" kern="1200" dirty="0"/>
-            <a:t>System</a:t>
-          </a:r>
-        </a:p>
-      </dsp:txBody>
-      <dsp:txXfrm>
-        <a:off x="2779109" y="1354666"/>
-        <a:ext cx="2676179" cy="1354666"/>
+        <a:off x="2744799" y="0"/>
+        <a:ext cx="2744799" cy="1806222"/>
       </dsp:txXfrm>
     </dsp:sp>
     <dsp:sp modelId="{787584E4-2AA0-449E-ACC8-BFCA17221B3B}">
@@ -1494,8 +1312,8 @@
       </dsp:nvSpPr>
       <dsp:spPr>
         <a:xfrm>
-          <a:off x="1029299" y="2709333"/>
-          <a:ext cx="6175798" cy="1354666"/>
+          <a:off x="1372399" y="1806222"/>
+          <a:ext cx="5489598" cy="1806222"/>
         </a:xfrm>
         <a:prstGeom prst="trapezoid">
           <a:avLst>
@@ -1503,11 +1321,12 @@
           </a:avLst>
         </a:prstGeom>
         <a:solidFill>
-          <a:schemeClr val="accent4">
+          <a:schemeClr val="accent1">
+            <a:alpha val="90000"/>
             <a:hueOff val="0"/>
             <a:satOff val="0"/>
             <a:lumOff val="0"/>
-            <a:alphaOff val="0"/>
+            <a:alphaOff val="-20000"/>
           </a:schemeClr>
         </a:solidFill>
         <a:ln w="19050" cap="flat" cmpd="sng" algn="ctr">
@@ -1563,8 +1382,8 @@
         </a:p>
       </dsp:txBody>
       <dsp:txXfrm>
-        <a:off x="2110064" y="2709333"/>
-        <a:ext cx="4014269" cy="1354666"/>
+        <a:off x="2333079" y="1806222"/>
+        <a:ext cx="3568239" cy="1806222"/>
       </dsp:txXfrm>
     </dsp:sp>
     <dsp:sp modelId="{C3A67625-05F0-426C-81EF-E0F141AF6EDF}">
@@ -1574,8 +1393,8 @@
       </dsp:nvSpPr>
       <dsp:spPr>
         <a:xfrm>
-          <a:off x="0" y="4064000"/>
-          <a:ext cx="8234398" cy="1354666"/>
+          <a:off x="0" y="3612444"/>
+          <a:ext cx="8234398" cy="1806222"/>
         </a:xfrm>
         <a:prstGeom prst="trapezoid">
           <a:avLst>
@@ -1583,11 +1402,12 @@
           </a:avLst>
         </a:prstGeom>
         <a:solidFill>
-          <a:schemeClr val="accent5">
+          <a:schemeClr val="accent1">
+            <a:alpha val="90000"/>
             <a:hueOff val="0"/>
             <a:satOff val="0"/>
             <a:lumOff val="0"/>
-            <a:alphaOff val="0"/>
+            <a:alphaOff val="-40000"/>
           </a:schemeClr>
         </a:solidFill>
         <a:ln w="19050" cap="flat" cmpd="sng" algn="ctr">
@@ -1643,8 +1463,8 @@
         </a:p>
       </dsp:txBody>
       <dsp:txXfrm>
-        <a:off x="1441019" y="4064000"/>
-        <a:ext cx="5352358" cy="1354666"/>
+        <a:off x="1441019" y="3612444"/>
+        <a:ext cx="5352358" cy="1806222"/>
       </dsp:txXfrm>
     </dsp:sp>
   </dsp:spTree>
@@ -3064,7 +2884,7 @@
           <a:p>
             <a:fld id="{664BE863-07F5-437E-AB19-6AF43130443A}" type="datetimeFigureOut">
               <a:rPr lang="en-US" smtClean="0"/>
-              <a:t>6/8/21</a:t>
+              <a:t>6/9/21</a:t>
             </a:fld>
             <a:endParaRPr lang="en-US"/>
           </a:p>
@@ -3262,7 +3082,7 @@
           <a:p>
             <a:fld id="{664BE863-07F5-437E-AB19-6AF43130443A}" type="datetimeFigureOut">
               <a:rPr lang="en-US" smtClean="0"/>
-              <a:t>6/8/21</a:t>
+              <a:t>6/9/21</a:t>
             </a:fld>
             <a:endParaRPr lang="en-US"/>
           </a:p>
@@ -3470,7 +3290,7 @@
           <a:p>
             <a:fld id="{664BE863-07F5-437E-AB19-6AF43130443A}" type="datetimeFigureOut">
               <a:rPr lang="en-US" smtClean="0"/>
-              <a:t>6/8/21</a:t>
+              <a:t>6/9/21</a:t>
             </a:fld>
             <a:endParaRPr lang="en-US"/>
           </a:p>
@@ -3668,7 +3488,7 @@
           <a:p>
             <a:fld id="{664BE863-07F5-437E-AB19-6AF43130443A}" type="datetimeFigureOut">
               <a:rPr lang="en-US" smtClean="0"/>
-              <a:t>6/8/21</a:t>
+              <a:t>6/9/21</a:t>
             </a:fld>
             <a:endParaRPr lang="en-US"/>
           </a:p>
@@ -3943,7 +3763,7 @@
           <a:p>
             <a:fld id="{664BE863-07F5-437E-AB19-6AF43130443A}" type="datetimeFigureOut">
               <a:rPr lang="en-US" smtClean="0"/>
-              <a:t>6/8/21</a:t>
+              <a:t>6/9/21</a:t>
             </a:fld>
             <a:endParaRPr lang="en-US"/>
           </a:p>
@@ -4208,7 +4028,7 @@
           <a:p>
             <a:fld id="{664BE863-07F5-437E-AB19-6AF43130443A}" type="datetimeFigureOut">
               <a:rPr lang="en-US" smtClean="0"/>
-              <a:t>6/8/21</a:t>
+              <a:t>6/9/21</a:t>
             </a:fld>
             <a:endParaRPr lang="en-US"/>
           </a:p>
@@ -4620,7 +4440,7 @@
           <a:p>
             <a:fld id="{664BE863-07F5-437E-AB19-6AF43130443A}" type="datetimeFigureOut">
               <a:rPr lang="en-US" smtClean="0"/>
-              <a:t>6/8/21</a:t>
+              <a:t>6/9/21</a:t>
             </a:fld>
             <a:endParaRPr lang="en-US"/>
           </a:p>
@@ -4761,7 +4581,7 @@
           <a:p>
             <a:fld id="{664BE863-07F5-437E-AB19-6AF43130443A}" type="datetimeFigureOut">
               <a:rPr lang="en-US" smtClean="0"/>
-              <a:t>6/8/21</a:t>
+              <a:t>6/9/21</a:t>
             </a:fld>
             <a:endParaRPr lang="en-US"/>
           </a:p>
@@ -4874,7 +4694,7 @@
           <a:p>
             <a:fld id="{664BE863-07F5-437E-AB19-6AF43130443A}" type="datetimeFigureOut">
               <a:rPr lang="en-US" smtClean="0"/>
-              <a:t>6/8/21</a:t>
+              <a:t>6/9/21</a:t>
             </a:fld>
             <a:endParaRPr lang="en-US"/>
           </a:p>
@@ -5185,7 +5005,7 @@
           <a:p>
             <a:fld id="{664BE863-07F5-437E-AB19-6AF43130443A}" type="datetimeFigureOut">
               <a:rPr lang="en-US" smtClean="0"/>
-              <a:t>6/8/21</a:t>
+              <a:t>6/9/21</a:t>
             </a:fld>
             <a:endParaRPr lang="en-US"/>
           </a:p>
@@ -5473,7 +5293,7 @@
           <a:p>
             <a:fld id="{664BE863-07F5-437E-AB19-6AF43130443A}" type="datetimeFigureOut">
               <a:rPr lang="en-US" smtClean="0"/>
-              <a:t>6/8/21</a:t>
+              <a:t>6/9/21</a:t>
             </a:fld>
             <a:endParaRPr lang="en-US"/>
           </a:p>
@@ -5714,7 +5534,7 @@
           <a:p>
             <a:fld id="{664BE863-07F5-437E-AB19-6AF43130443A}" type="datetimeFigureOut">
               <a:rPr lang="en-US" smtClean="0"/>
-              <a:t>6/8/21</a:t>
+              <a:t>6/9/21</a:t>
             </a:fld>
             <a:endParaRPr lang="en-US"/>
           </a:p>
@@ -6164,7 +5984,7 @@
             <p:nvPr>
               <p:extLst>
                 <p:ext uri="{D42A27DB-BD31-4B8C-83A1-F6EECF244321}">
-                  <p14:modId xmlns:p14="http://schemas.microsoft.com/office/powerpoint/2010/main" val="3468141082"/>
+                  <p14:modId xmlns:p14="http://schemas.microsoft.com/office/powerpoint/2010/main" val="4253531564"/>
                 </p:ext>
               </p:extLst>
             </p:nvPr>
@@ -6240,6 +6060,10 @@
               <a:avLst/>
             </a:prstGeom>
             <a:noFill/>
+            <a:ln>
+              <a:noFill/>
+            </a:ln>
+            <a:effectLst/>
           </p:spPr>
           <p:txBody>
             <a:bodyPr wrap="square" lIns="91440" tIns="45720" rIns="91440" bIns="45720">
@@ -6251,16 +6075,14 @@
               <a:r>
                 <a:rPr lang="en-US" sz="4400" b="1" cap="none" spc="0" dirty="0">
                   <a:ln w="9525">
-                    <a:solidFill>
-                      <a:schemeClr val="bg1"/>
-                    </a:solidFill>
+                    <a:noFill/>
                     <a:prstDash val="solid"/>
                   </a:ln>
                   <a:solidFill>
                     <a:srgbClr val="70AD47"/>
                   </a:solidFill>
                   <a:effectLst>
-                    <a:outerShdw blurRad="12700" dist="38100" dir="2700000" algn="tl" rotWithShape="0">
+                    <a:outerShdw blurRad="12700" dist="38100" dir="2700000" sx="1000" sy="1000" algn="tl" rotWithShape="0">
                       <a:schemeClr val="bg1">
                         <a:lumMod val="50000"/>
                       </a:schemeClr>
@@ -6293,6 +6115,13 @@
               <a:avLst/>
             </a:prstGeom>
             <a:noFill/>
+            <a:effectLst>
+              <a:outerShdw blurRad="50800" dist="50800" dir="5400000" sx="1000" sy="1000" algn="ctr" rotWithShape="0">
+                <a:srgbClr val="000000">
+                  <a:alpha val="43137"/>
+                </a:srgbClr>
+              </a:outerShdw>
+            </a:effectLst>
           </p:spPr>
           <p:txBody>
             <a:bodyPr wrap="square" lIns="91440" tIns="45720" rIns="91440" bIns="45720">
@@ -6304,16 +6133,14 @@
               <a:r>
                 <a:rPr lang="en-US" sz="4400" b="1" cap="none" spc="0" dirty="0">
                   <a:ln w="9525">
-                    <a:solidFill>
-                      <a:schemeClr val="bg1"/>
-                    </a:solidFill>
+                    <a:noFill/>
                     <a:prstDash val="solid"/>
                   </a:ln>
                   <a:solidFill>
                     <a:srgbClr val="70AD47"/>
                   </a:solidFill>
                   <a:effectLst>
-                    <a:outerShdw blurRad="12700" dist="38100" dir="2700000" algn="tl" rotWithShape="0">
+                    <a:outerShdw blurRad="12700" dist="38100" dir="2700000" sx="1000" sy="1000" algn="tl" rotWithShape="0">
                       <a:schemeClr val="bg1">
                         <a:lumMod val="50000"/>
                       </a:schemeClr>
@@ -6322,6 +6149,24 @@
                 </a:rPr>
                 <a:t>$</a:t>
               </a:r>
+              <a:endParaRPr lang="en-US" sz="4400" b="1" cap="none" spc="0" dirty="0">
+                <a:ln w="9525">
+                  <a:solidFill>
+                    <a:schemeClr val="bg1"/>
+                  </a:solidFill>
+                  <a:prstDash val="solid"/>
+                </a:ln>
+                <a:solidFill>
+                  <a:srgbClr val="70AD47"/>
+                </a:solidFill>
+                <a:effectLst>
+                  <a:outerShdw blurRad="12700" dist="38100" dir="2700000" algn="tl" rotWithShape="0">
+                    <a:schemeClr val="bg1">
+                      <a:lumMod val="50000"/>
+                    </a:schemeClr>
+                  </a:outerShdw>
+                </a:effectLst>
+              </a:endParaRPr>
             </a:p>
           </p:txBody>
         </p:sp>
@@ -6495,6 +6340,38 @@
           </p:txBody>
         </p:sp>
       </p:grpSp>
+      <p:sp>
+        <p:nvSpPr>
+          <p:cNvPr id="2" name="TextBox 1">
+            <a:extLst>
+              <a:ext uri="{FF2B5EF4-FFF2-40B4-BE49-F238E27FC236}">
+                <a16:creationId xmlns:a16="http://schemas.microsoft.com/office/drawing/2014/main" id="{24754922-6CA3-7444-83F7-7EBDE3927780}"/>
+              </a:ext>
+            </a:extLst>
+          </p:cNvPr>
+          <p:cNvSpPr txBox="1"/>
+          <p:nvPr/>
+        </p:nvSpPr>
+        <p:spPr>
+          <a:xfrm>
+            <a:off x="1376855" y="1776248"/>
+            <a:ext cx="184731" cy="369332"/>
+          </a:xfrm>
+          <a:prstGeom prst="rect">
+            <a:avLst/>
+          </a:prstGeom>
+          <a:noFill/>
+        </p:spPr>
+        <p:txBody>
+          <a:bodyPr wrap="none" rtlCol="0">
+            <a:spAutoFit/>
+          </a:bodyPr>
+          <a:lstStyle/>
+          <a:p>
+            <a:endParaRPr lang="en-CH" dirty="0"/>
+          </a:p>
+        </p:txBody>
+      </p:sp>
     </p:spTree>
     <p:extLst>
       <p:ext uri="{BB962C8B-B14F-4D97-AF65-F5344CB8AC3E}">

</xml_diff>